<commit_message>
Tweaked the end slides
</commit_message>
<xml_diff>
--- a/Slides.pptx
+++ b/Slides.pptx
@@ -5,7 +5,7 @@
     <p:sldMasterId id="2147483660" r:id="rId1"/>
   </p:sldMasterIdLst>
   <p:notesMasterIdLst>
-    <p:notesMasterId r:id="rId18"/>
+    <p:notesMasterId r:id="rId19"/>
   </p:notesMasterIdLst>
   <p:sldIdLst>
     <p:sldId id="256" r:id="rId2"/>
@@ -22,8 +22,9 @@
     <p:sldId id="271" r:id="rId13"/>
     <p:sldId id="260" r:id="rId14"/>
     <p:sldId id="263" r:id="rId15"/>
-    <p:sldId id="262" r:id="rId16"/>
-    <p:sldId id="264" r:id="rId17"/>
+    <p:sldId id="264" r:id="rId16"/>
+    <p:sldId id="262" r:id="rId17"/>
+    <p:sldId id="273" r:id="rId18"/>
   </p:sldIdLst>
   <p:sldSz cx="9144000" cy="6858000" type="screen4x3"/>
   <p:notesSz cx="6858000" cy="9144000"/>
@@ -207,7 +208,7 @@
           <a:p>
             <a:fld id="{EFE26226-6921-6544-BAF7-AA3A634B6AB9}" type="datetimeFigureOut">
               <a:rPr lang="en-US" smtClean="0"/>
-              <a:t>7/8/16</a:t>
+              <a:t>8/9/16</a:t>
             </a:fld>
             <a:endParaRPr lang="en-US"/>
           </a:p>
@@ -964,7 +965,7 @@
           <a:p>
             <a:fld id="{B01F9CA3-105E-4857-9057-6DB6197DA786}" type="datetimeFigureOut">
               <a:rPr lang="en-US" smtClean="0"/>
-              <a:t>7/8/16</a:t>
+              <a:t>8/9/16</a:t>
             </a:fld>
             <a:endParaRPr lang="en-US"/>
           </a:p>
@@ -1156,7 +1157,7 @@
           <a:p>
             <a:fld id="{B01F9CA3-105E-4857-9057-6DB6197DA786}" type="datetimeFigureOut">
               <a:rPr lang="en-US" smtClean="0"/>
-              <a:t>7/8/16</a:t>
+              <a:t>8/9/16</a:t>
             </a:fld>
             <a:endParaRPr lang="en-US"/>
           </a:p>
@@ -1425,7 +1426,7 @@
           <a:p>
             <a:fld id="{B01F9CA3-105E-4857-9057-6DB6197DA786}" type="datetimeFigureOut">
               <a:rPr lang="en-US" smtClean="0"/>
-              <a:t>7/8/16</a:t>
+              <a:t>8/9/16</a:t>
             </a:fld>
             <a:endParaRPr lang="en-US"/>
           </a:p>
@@ -1604,7 +1605,7 @@
           <a:p>
             <a:fld id="{B01F9CA3-105E-4857-9057-6DB6197DA786}" type="datetimeFigureOut">
               <a:rPr lang="en-US" smtClean="0"/>
-              <a:t>7/8/16</a:t>
+              <a:t>8/9/16</a:t>
             </a:fld>
             <a:endParaRPr lang="en-US"/>
           </a:p>
@@ -1773,7 +1774,7 @@
           <a:p>
             <a:fld id="{B01F9CA3-105E-4857-9057-6DB6197DA786}" type="datetimeFigureOut">
               <a:rPr lang="en-US" smtClean="0"/>
-              <a:t>7/8/16</a:t>
+              <a:t>8/9/16</a:t>
             </a:fld>
             <a:endParaRPr lang="en-US"/>
           </a:p>
@@ -2015,7 +2016,7 @@
           <a:p>
             <a:fld id="{B01F9CA3-105E-4857-9057-6DB6197DA786}" type="datetimeFigureOut">
               <a:rPr lang="en-US" smtClean="0"/>
-              <a:t>7/8/16</a:t>
+              <a:t>8/9/16</a:t>
             </a:fld>
             <a:endParaRPr lang="en-US"/>
           </a:p>
@@ -2338,7 +2339,7 @@
           <a:p>
             <a:fld id="{B01F9CA3-105E-4857-9057-6DB6197DA786}" type="datetimeFigureOut">
               <a:rPr lang="en-US" smtClean="0"/>
-              <a:t>7/8/16</a:t>
+              <a:t>8/9/16</a:t>
             </a:fld>
             <a:endParaRPr lang="en-US"/>
           </a:p>
@@ -2636,7 +2637,7 @@
           <a:p>
             <a:fld id="{B01F9CA3-105E-4857-9057-6DB6197DA786}" type="datetimeFigureOut">
               <a:rPr lang="en-US" smtClean="0"/>
-              <a:t>7/8/16</a:t>
+              <a:t>8/9/16</a:t>
             </a:fld>
             <a:endParaRPr lang="en-US"/>
           </a:p>
@@ -3092,7 +3093,7 @@
           <a:p>
             <a:fld id="{B01F9CA3-105E-4857-9057-6DB6197DA786}" type="datetimeFigureOut">
               <a:rPr lang="en-US" smtClean="0"/>
-              <a:t>7/8/16</a:t>
+              <a:t>8/9/16</a:t>
             </a:fld>
             <a:endParaRPr lang="en-US"/>
           </a:p>
@@ -3205,7 +3206,7 @@
           <a:p>
             <a:fld id="{B01F9CA3-105E-4857-9057-6DB6197DA786}" type="datetimeFigureOut">
               <a:rPr lang="en-US" smtClean="0"/>
-              <a:t>7/8/16</a:t>
+              <a:t>8/9/16</a:t>
             </a:fld>
             <a:endParaRPr lang="en-US"/>
           </a:p>
@@ -3295,7 +3296,7 @@
           <a:p>
             <a:fld id="{B01F9CA3-105E-4857-9057-6DB6197DA786}" type="datetimeFigureOut">
               <a:rPr lang="en-US" smtClean="0"/>
-              <a:t>7/8/16</a:t>
+              <a:t>8/9/16</a:t>
             </a:fld>
             <a:endParaRPr lang="en-US"/>
           </a:p>
@@ -3577,7 +3578,7 @@
           <a:p>
             <a:fld id="{B01F9CA3-105E-4857-9057-6DB6197DA786}" type="datetimeFigureOut">
               <a:rPr lang="en-US" smtClean="0"/>
-              <a:t>7/8/16</a:t>
+              <a:t>8/9/16</a:t>
             </a:fld>
             <a:endParaRPr lang="en-US"/>
           </a:p>
@@ -3783,7 +3784,7 @@
           <a:p>
             <a:fld id="{B01F9CA3-105E-4857-9057-6DB6197DA786}" type="datetimeFigureOut">
               <a:rPr lang="en-US" smtClean="0"/>
-              <a:t>7/8/16</a:t>
+              <a:t>8/9/16</a:t>
             </a:fld>
             <a:endParaRPr lang="en-US"/>
           </a:p>
@@ -4809,6 +4810,113 @@
           <a:p>
             <a:r>
               <a:rPr lang="en-US" dirty="0" smtClean="0"/>
+              <a:t>Reactive Streams </a:t>
+            </a:r>
+            <a:r>
+              <a:rPr lang="en-US" dirty="0" smtClean="0"/>
+              <a:t>Libraries</a:t>
+            </a:r>
+            <a:endParaRPr lang="en-US" dirty="0"/>
+          </a:p>
+        </p:txBody>
+      </p:sp>
+      <p:sp>
+        <p:nvSpPr>
+          <p:cNvPr id="3" name="Content Placeholder 2"/>
+          <p:cNvSpPr>
+            <a:spLocks noGrp="1"/>
+          </p:cNvSpPr>
+          <p:nvPr>
+            <p:ph idx="1"/>
+          </p:nvPr>
+        </p:nvSpPr>
+        <p:spPr/>
+        <p:txBody>
+          <a:bodyPr/>
+          <a:lstStyle/>
+          <a:p>
+            <a:r>
+              <a:rPr lang="en-US" dirty="0" err="1" smtClean="0"/>
+              <a:t>Ratpack</a:t>
+            </a:r>
+            <a:endParaRPr lang="en-US" dirty="0" smtClean="0"/>
+          </a:p>
+          <a:p>
+            <a:r>
+              <a:rPr lang="en-US" dirty="0" smtClean="0"/>
+              <a:t>Spring Reactor</a:t>
+            </a:r>
+          </a:p>
+          <a:p>
+            <a:r>
+              <a:rPr lang="en-US" dirty="0" err="1" smtClean="0"/>
+              <a:t>Akk</a:t>
+            </a:r>
+            <a:r>
+              <a:rPr lang="en-US" dirty="0" err="1" smtClean="0"/>
+              <a:t>a</a:t>
+            </a:r>
+            <a:r>
+              <a:rPr lang="en-US" dirty="0" smtClean="0"/>
+              <a:t> Streams</a:t>
+            </a:r>
+          </a:p>
+          <a:p>
+            <a:r>
+              <a:rPr lang="en-US" dirty="0" err="1" smtClean="0"/>
+              <a:t>Vert.x</a:t>
+            </a:r>
+            <a:endParaRPr lang="en-US" dirty="0"/>
+          </a:p>
+        </p:txBody>
+      </p:sp>
+    </p:spTree>
+    <p:extLst>
+      <p:ext uri="{BB962C8B-B14F-4D97-AF65-F5344CB8AC3E}">
+        <p14:creationId xmlns:p14="http://schemas.microsoft.com/office/powerpoint/2010/main" val="2647449944"/>
+      </p:ext>
+    </p:extLst>
+  </p:cSld>
+  <p:clrMapOvr>
+    <a:masterClrMapping/>
+  </p:clrMapOvr>
+</p:sld>
+</file>
+
+<file path=ppt/slides/slide16.xml><?xml version="1.0" encoding="utf-8"?>
+<p:sld xmlns:a="http://schemas.openxmlformats.org/drawingml/2006/main" xmlns:r="http://schemas.openxmlformats.org/officeDocument/2006/relationships" xmlns:p="http://schemas.openxmlformats.org/presentationml/2006/main">
+  <p:cSld>
+    <p:spTree>
+      <p:nvGrpSpPr>
+        <p:cNvPr id="1" name=""/>
+        <p:cNvGrpSpPr/>
+        <p:nvPr/>
+      </p:nvGrpSpPr>
+      <p:grpSpPr>
+        <a:xfrm>
+          <a:off x="0" y="0"/>
+          <a:ext cx="0" cy="0"/>
+          <a:chOff x="0" y="0"/>
+          <a:chExt cx="0" cy="0"/>
+        </a:xfrm>
+      </p:grpSpPr>
+      <p:sp>
+        <p:nvSpPr>
+          <p:cNvPr id="2" name="Title 1"/>
+          <p:cNvSpPr>
+            <a:spLocks noGrp="1"/>
+          </p:cNvSpPr>
+          <p:nvPr>
+            <p:ph type="title"/>
+          </p:nvPr>
+        </p:nvSpPr>
+        <p:spPr/>
+        <p:txBody>
+          <a:bodyPr/>
+          <a:lstStyle/>
+          <a:p>
+            <a:r>
+              <a:rPr lang="en-US" dirty="0" smtClean="0"/>
               <a:t>Resources</a:t>
             </a:r>
             <a:endParaRPr lang="en-US" dirty="0"/>
@@ -4921,7 +5029,7 @@
 </p:sld>
 </file>
 
-<file path=ppt/slides/slide16.xml><?xml version="1.0" encoding="utf-8"?>
+<file path=ppt/slides/slide17.xml><?xml version="1.0" encoding="utf-8"?>
 <p:sld xmlns:a="http://schemas.openxmlformats.org/drawingml/2006/main" xmlns:r="http://schemas.openxmlformats.org/officeDocument/2006/relationships" xmlns:p="http://schemas.openxmlformats.org/presentationml/2006/main">
   <p:cSld>
     <p:spTree>
@@ -4953,40 +5061,79 @@
           <a:bodyPr/>
           <a:lstStyle/>
           <a:p>
+            <a:endParaRPr lang="en-US" dirty="0"/>
+          </a:p>
+        </p:txBody>
+      </p:sp>
+      <p:sp>
+        <p:nvSpPr>
+          <p:cNvPr id="3" name="Content Placeholder 2"/>
+          <p:cNvSpPr>
+            <a:spLocks noGrp="1"/>
+          </p:cNvSpPr>
+          <p:nvPr>
+            <p:ph idx="1"/>
+          </p:nvPr>
+        </p:nvSpPr>
+        <p:spPr/>
+        <p:txBody>
+          <a:bodyPr/>
+          <a:lstStyle/>
+          <a:p>
+            <a:pPr marL="0" indent="0">
+              <a:buNone/>
+            </a:pPr>
+            <a:r>
+              <a:rPr lang="en-US" dirty="0"/>
+              <a:t>Seth </a:t>
+            </a:r>
             <a:r>
               <a:rPr lang="en-US" dirty="0" smtClean="0"/>
-              <a:t>Reactive Libraries</a:t>
-            </a:r>
-            <a:endParaRPr lang="en-US" dirty="0"/>
-          </a:p>
-        </p:txBody>
-      </p:sp>
-      <p:sp>
-        <p:nvSpPr>
-          <p:cNvPr id="3" name="Content Placeholder 2"/>
-          <p:cNvSpPr>
-            <a:spLocks noGrp="1"/>
-          </p:cNvSpPr>
-          <p:nvPr>
-            <p:ph idx="1"/>
-          </p:nvPr>
-        </p:nvSpPr>
-        <p:spPr/>
-        <p:txBody>
-          <a:bodyPr/>
-          <a:lstStyle/>
-          <a:p>
+              <a:t>Kraut</a:t>
+            </a:r>
             <a:r>
               <a:rPr lang="en-US" dirty="0"/>
-              <a:t>https://</a:t>
+              <a:t> </a:t>
+            </a:r>
+            <a:r>
+              <a:rPr lang="en-US" dirty="0" smtClean="0"/>
+              <a:t>- </a:t>
+            </a:r>
+            <a:r>
+              <a:rPr lang="en-US" dirty="0" smtClean="0">
+                <a:hlinkClick r:id="rId2"/>
+              </a:rPr>
+              <a:t>sethkraut@gmail.com</a:t>
+            </a:r>
+            <a:endParaRPr lang="en-US" dirty="0" smtClean="0"/>
+          </a:p>
+          <a:p>
+            <a:pPr marL="0" indent="0">
+              <a:buNone/>
+            </a:pPr>
+            <a:r>
+              <a:rPr lang="en-US" dirty="0" smtClean="0"/>
+              <a:t>https</a:t>
+            </a:r>
+            <a:r>
+              <a:rPr lang="en-US" dirty="0"/>
+              <a:t>://</a:t>
             </a:r>
             <a:r>
               <a:rPr lang="en-US" dirty="0" err="1"/>
-              <a:t>ratpack.io</a:t>
+              <a:t>github.com</a:t>
             </a:r>
             <a:r>
               <a:rPr lang="en-US" dirty="0"/>
               <a:t>/</a:t>
+            </a:r>
+            <a:r>
+              <a:rPr lang="en-US" dirty="0" err="1"/>
+              <a:t>sethkraut</a:t>
+            </a:r>
+            <a:r>
+              <a:rPr lang="en-US" dirty="0"/>
+              <a:t>/presentation-reactive-streams</a:t>
             </a:r>
           </a:p>
         </p:txBody>
@@ -4994,7 +5141,7 @@
     </p:spTree>
     <p:extLst>
       <p:ext uri="{BB962C8B-B14F-4D97-AF65-F5344CB8AC3E}">
-        <p14:creationId xmlns:p14="http://schemas.microsoft.com/office/powerpoint/2010/main" val="2647449944"/>
+        <p14:creationId xmlns:p14="http://schemas.microsoft.com/office/powerpoint/2010/main" val="3142931660"/>
       </p:ext>
     </p:extLst>
   </p:cSld>
@@ -5311,11 +5458,7 @@
             <a:pPr lvl="1"/>
             <a:r>
               <a:rPr lang="en-US" dirty="0" smtClean="0"/>
-              <a:t>next(</a:t>
-            </a:r>
-            <a:r>
-              <a:rPr lang="en-US" dirty="0" smtClean="0"/>
-              <a:t>)</a:t>
+              <a:t>next()</a:t>
             </a:r>
           </a:p>
           <a:p>
@@ -5698,13 +5841,8 @@
           <a:p>
             <a:r>
               <a:rPr lang="en-US" dirty="0" smtClean="0"/>
-              <a:t>Adds </a:t>
-            </a:r>
-            <a:r>
-              <a:rPr lang="en-US" dirty="0" smtClean="0"/>
-              <a:t>backpressure</a:t>
-            </a:r>
-            <a:endParaRPr lang="en-US" dirty="0" smtClean="0"/>
+              <a:t>Adds backpressure</a:t>
+            </a:r>
           </a:p>
           <a:p>
             <a:r>

</xml_diff>